<commit_message>
Added table of runtimes to clustering
</commit_message>
<xml_diff>
--- a/Data_Mining_Poster.pptx
+++ b/Data_Mining_Poster.pptx
@@ -3766,8 +3766,8 @@
         </p:blipFill>
         <p:spPr>
           <a:xfrm>
-            <a:off x="11372126" y="7590704"/>
-            <a:ext cx="4987707" cy="3324158"/>
+            <a:off x="11372126" y="6970022"/>
+            <a:ext cx="5158736" cy="3438144"/>
           </a:xfrm>
           <a:prstGeom prst="rect">
             <a:avLst/>
@@ -3796,8 +3796,8 @@
         </p:blipFill>
         <p:spPr>
           <a:xfrm>
-            <a:off x="16665666" y="7698654"/>
-            <a:ext cx="4993460" cy="3216208"/>
+            <a:off x="16317244" y="7011413"/>
+            <a:ext cx="5341882" cy="3440621"/>
           </a:xfrm>
           <a:prstGeom prst="rect">
             <a:avLst/>
@@ -4639,7 +4639,7 @@
         </p:nvSpPr>
         <p:spPr>
           <a:xfrm>
-            <a:off x="11372126" y="11379200"/>
+            <a:off x="11372126" y="10280297"/>
             <a:ext cx="10287000" cy="1200328"/>
           </a:xfrm>
           <a:prstGeom prst="rect">
@@ -4673,6 +4673,410 @@
             <a:r>
               <a:rPr lang="en-US" sz="2400" dirty="0" smtClean="0"/>
               <a:t> users. (Left) cluster of users who post and follow professional sports.  (Right) Users who are involved in fantasy sports leagues.</a:t>
+            </a:r>
+            <a:endParaRPr lang="en-US" sz="2400" b="1" dirty="0"/>
+          </a:p>
+        </p:txBody>
+      </p:sp>
+      <p:sp>
+        <p:nvSpPr>
+          <p:cNvPr id="3" name="TextBox 2"/>
+          <p:cNvSpPr txBox="1"/>
+          <p:nvPr/>
+        </p:nvSpPr>
+        <p:spPr>
+          <a:xfrm>
+            <a:off x="22570261" y="14630400"/>
+            <a:ext cx="10058400" cy="4524315"/>
+          </a:xfrm>
+          <a:prstGeom prst="rect">
+            <a:avLst/>
+          </a:prstGeom>
+          <a:noFill/>
+        </p:spPr>
+        <p:txBody>
+          <a:bodyPr wrap="square" rtlCol="0">
+            <a:spAutoFit/>
+          </a:bodyPr>
+          <a:lstStyle/>
+          <a:p>
+            <a:r>
+              <a:rPr lang="en-US" sz="3200" dirty="0" smtClean="0"/>
+              <a:t>We find:</a:t>
+            </a:r>
+          </a:p>
+          <a:p>
+            <a:pPr marL="514350" indent="-514350">
+              <a:buFont typeface="+mj-lt"/>
+              <a:buAutoNum type="arabicPeriod"/>
+            </a:pPr>
+            <a:r>
+              <a:rPr lang="en-US" sz="3200" dirty="0" smtClean="0"/>
+              <a:t>The words alone do not give a good indicator of post likeability.</a:t>
+            </a:r>
+          </a:p>
+          <a:p>
+            <a:pPr marL="514350" indent="-514350">
+              <a:buFont typeface="+mj-lt"/>
+              <a:buAutoNum type="arabicPeriod"/>
+            </a:pPr>
+            <a:r>
+              <a:rPr lang="en-US" sz="3200" dirty="0" smtClean="0"/>
+              <a:t>Most of the similarity comes from posts with a very large number of likes (&gt;1000)</a:t>
+            </a:r>
+          </a:p>
+          <a:p>
+            <a:pPr marL="514350" indent="-514350">
+              <a:buFont typeface="+mj-lt"/>
+              <a:buAutoNum type="arabicPeriod"/>
+            </a:pPr>
+            <a:r>
+              <a:rPr lang="en-US" sz="3200" dirty="0" smtClean="0"/>
+              <a:t>It is possible to uncover relationships between </a:t>
+            </a:r>
+            <a:r>
+              <a:rPr lang="en-US" sz="3200" dirty="0" err="1" smtClean="0"/>
+              <a:t>reddit</a:t>
+            </a:r>
+            <a:r>
+              <a:rPr lang="en-US" sz="3200" dirty="0" smtClean="0"/>
+              <a:t> posts by examining user postings</a:t>
+            </a:r>
+          </a:p>
+          <a:p>
+            <a:pPr marL="514350" indent="-514350">
+              <a:buFont typeface="+mj-lt"/>
+              <a:buAutoNum type="arabicPeriod"/>
+            </a:pPr>
+            <a:endParaRPr lang="en-US" sz="3200" dirty="0" smtClean="0"/>
+          </a:p>
+          <a:p>
+            <a:pPr marL="514350" indent="-514350">
+              <a:buFont typeface="+mj-lt"/>
+              <a:buAutoNum type="arabicPeriod"/>
+            </a:pPr>
+            <a:endParaRPr lang="en-US" sz="3200" dirty="0" smtClean="0"/>
+          </a:p>
+        </p:txBody>
+      </p:sp>
+      <p:graphicFrame>
+        <p:nvGraphicFramePr>
+          <p:cNvPr id="23" name="Table 22"/>
+          <p:cNvGraphicFramePr>
+            <a:graphicFrameLocks noGrp="1"/>
+          </p:cNvGraphicFramePr>
+          <p:nvPr>
+            <p:extLst>
+              <p:ext uri="{D42A27DB-BD31-4B8C-83A1-F6EECF244321}">
+                <p14:modId xmlns:p14="http://schemas.microsoft.com/office/powerpoint/2010/main" val="1581464656"/>
+              </p:ext>
+            </p:extLst>
+          </p:nvPr>
+        </p:nvGraphicFramePr>
+        <p:xfrm>
+          <a:off x="11372126" y="11733167"/>
+          <a:ext cx="6172200" cy="2286000"/>
+        </p:xfrm>
+        <a:graphic>
+          <a:graphicData uri="http://schemas.openxmlformats.org/drawingml/2006/table">
+            <a:tbl>
+              <a:tblPr firstRow="1" bandRow="1">
+                <a:tableStyleId>{5C22544A-7EE6-4342-B048-85BDC9FD1C3A}</a:tableStyleId>
+              </a:tblPr>
+              <a:tblGrid>
+                <a:gridCol w="2057400"/>
+                <a:gridCol w="2057400"/>
+                <a:gridCol w="2057400"/>
+              </a:tblGrid>
+              <a:tr h="417683">
+                <a:tc>
+                  <a:txBody>
+                    <a:bodyPr/>
+                    <a:lstStyle/>
+                    <a:p>
+                      <a:pPr algn="ctr"/>
+                      <a:r>
+                        <a:rPr lang="en-US" sz="2400" dirty="0" smtClean="0"/>
+                        <a:t>Algorithm</a:t>
+                      </a:r>
+                      <a:endParaRPr lang="en-US" sz="2400" dirty="0"/>
+                    </a:p>
+                  </a:txBody>
+                  <a:tcPr/>
+                </a:tc>
+                <a:tc>
+                  <a:txBody>
+                    <a:bodyPr/>
+                    <a:lstStyle/>
+                    <a:p>
+                      <a:pPr algn="ctr"/>
+                      <a:r>
+                        <a:rPr lang="en-US" sz="2400" dirty="0" smtClean="0"/>
+                        <a:t>Parameters</a:t>
+                      </a:r>
+                      <a:endParaRPr lang="en-US" sz="2400" dirty="0"/>
+                    </a:p>
+                  </a:txBody>
+                  <a:tcPr/>
+                </a:tc>
+                <a:tc>
+                  <a:txBody>
+                    <a:bodyPr/>
+                    <a:lstStyle/>
+                    <a:p>
+                      <a:pPr algn="ctr"/>
+                      <a:r>
+                        <a:rPr lang="en-US" sz="2400" dirty="0" smtClean="0"/>
+                        <a:t>Time (sec)</a:t>
+                      </a:r>
+                      <a:endParaRPr lang="en-US" sz="2400" dirty="0"/>
+                    </a:p>
+                  </a:txBody>
+                  <a:tcPr/>
+                </a:tc>
+              </a:tr>
+              <a:tr h="449813">
+                <a:tc>
+                  <a:txBody>
+                    <a:bodyPr/>
+                    <a:lstStyle/>
+                    <a:p>
+                      <a:pPr algn="ctr"/>
+                      <a:r>
+                        <a:rPr lang="en-US" sz="2400" dirty="0" smtClean="0"/>
+                        <a:t>k-means</a:t>
+                      </a:r>
+                      <a:endParaRPr lang="en-US" sz="2400" dirty="0"/>
+                    </a:p>
+                  </a:txBody>
+                  <a:tcPr/>
+                </a:tc>
+                <a:tc>
+                  <a:txBody>
+                    <a:bodyPr/>
+                    <a:lstStyle/>
+                    <a:p>
+                      <a:pPr algn="ctr"/>
+                      <a:r>
+                        <a:rPr lang="en-US" sz="2400" dirty="0" smtClean="0"/>
+                        <a:t>-</a:t>
+                      </a:r>
+                      <a:endParaRPr lang="en-US" sz="2400" dirty="0"/>
+                    </a:p>
+                  </a:txBody>
+                  <a:tcPr/>
+                </a:tc>
+                <a:tc>
+                  <a:txBody>
+                    <a:bodyPr/>
+                    <a:lstStyle/>
+                    <a:p>
+                      <a:pPr algn="ctr"/>
+                      <a:r>
+                        <a:rPr lang="en-US" sz="2400" dirty="0" smtClean="0"/>
+                        <a:t>287</a:t>
+                      </a:r>
+                      <a:endParaRPr lang="en-US" sz="2400" dirty="0"/>
+                    </a:p>
+                  </a:txBody>
+                  <a:tcPr/>
+                </a:tc>
+              </a:tr>
+              <a:tr h="449813">
+                <a:tc>
+                  <a:txBody>
+                    <a:bodyPr/>
+                    <a:lstStyle/>
+                    <a:p>
+                      <a:pPr algn="ctr"/>
+                      <a:r>
+                        <a:rPr lang="en-US" sz="2400" dirty="0" smtClean="0"/>
+                        <a:t>k-means SVD</a:t>
+                      </a:r>
+                      <a:endParaRPr lang="en-US" sz="2400" dirty="0"/>
+                    </a:p>
+                  </a:txBody>
+                  <a:tcPr/>
+                </a:tc>
+                <a:tc>
+                  <a:txBody>
+                    <a:bodyPr/>
+                    <a:lstStyle/>
+                    <a:p>
+                      <a:pPr algn="ctr"/>
+                      <a:r>
+                        <a:rPr lang="en-US" sz="2400" dirty="0" smtClean="0"/>
+                        <a:t>k</a:t>
+                      </a:r>
+                      <a:r>
+                        <a:rPr lang="en-US" sz="2400" baseline="0" dirty="0" smtClean="0"/>
+                        <a:t> </a:t>
+                      </a:r>
+                      <a:r>
+                        <a:rPr lang="en-US" sz="2400" dirty="0" smtClean="0"/>
+                        <a:t>= 60</a:t>
+                      </a:r>
+                      <a:endParaRPr lang="en-US" sz="2400" dirty="0"/>
+                    </a:p>
+                  </a:txBody>
+                  <a:tcPr/>
+                </a:tc>
+                <a:tc>
+                  <a:txBody>
+                    <a:bodyPr/>
+                    <a:lstStyle/>
+                    <a:p>
+                      <a:pPr algn="ctr"/>
+                      <a:r>
+                        <a:rPr lang="en-US" sz="2400" dirty="0" smtClean="0"/>
+                        <a:t>13</a:t>
+                      </a:r>
+                      <a:endParaRPr lang="en-US" sz="2400" dirty="0"/>
+                    </a:p>
+                  </a:txBody>
+                  <a:tcPr/>
+                </a:tc>
+              </a:tr>
+              <a:tr h="449813">
+                <a:tc>
+                  <a:txBody>
+                    <a:bodyPr/>
+                    <a:lstStyle/>
+                    <a:p>
+                      <a:pPr algn="ctr"/>
+                      <a:r>
+                        <a:rPr lang="en-US" sz="2400" dirty="0" smtClean="0"/>
+                        <a:t>k-means JLT</a:t>
+                      </a:r>
+                      <a:endParaRPr lang="en-US" sz="2400" dirty="0"/>
+                    </a:p>
+                  </a:txBody>
+                  <a:tcPr/>
+                </a:tc>
+                <a:tc>
+                  <a:txBody>
+                    <a:bodyPr/>
+                    <a:lstStyle/>
+                    <a:p>
+                      <a:pPr algn="ctr"/>
+                      <a:r>
+                        <a:rPr lang="en-US" sz="2400" dirty="0" smtClean="0"/>
+                        <a:t>k = 100</a:t>
+                      </a:r>
+                      <a:endParaRPr lang="en-US" sz="2400" dirty="0"/>
+                    </a:p>
+                  </a:txBody>
+                  <a:tcPr/>
+                </a:tc>
+                <a:tc>
+                  <a:txBody>
+                    <a:bodyPr/>
+                    <a:lstStyle/>
+                    <a:p>
+                      <a:pPr algn="ctr"/>
+                      <a:r>
+                        <a:rPr lang="en-US" sz="2400" dirty="0" smtClean="0"/>
+                        <a:t>28</a:t>
+                      </a:r>
+                      <a:endParaRPr lang="en-US" sz="2400" dirty="0"/>
+                    </a:p>
+                  </a:txBody>
+                  <a:tcPr/>
+                </a:tc>
+              </a:tr>
+              <a:tr h="449813">
+                <a:tc>
+                  <a:txBody>
+                    <a:bodyPr/>
+                    <a:lstStyle/>
+                    <a:p>
+                      <a:pPr algn="ctr"/>
+                      <a:r>
+                        <a:rPr lang="en-US" sz="2400" dirty="0" smtClean="0"/>
+                        <a:t>k-means LSH</a:t>
+                      </a:r>
+                      <a:endParaRPr lang="en-US" sz="2400" dirty="0"/>
+                    </a:p>
+                  </a:txBody>
+                  <a:tcPr/>
+                </a:tc>
+                <a:tc>
+                  <a:txBody>
+                    <a:bodyPr/>
+                    <a:lstStyle/>
+                    <a:p>
+                      <a:pPr algn="ctr"/>
+                      <a:r>
+                        <a:rPr lang="en-US" sz="2400" dirty="0" smtClean="0"/>
+                        <a:t>B=6, r =</a:t>
+                      </a:r>
+                      <a:r>
+                        <a:rPr lang="en-US" sz="2400" baseline="0" dirty="0" smtClean="0"/>
+                        <a:t> 30</a:t>
+                      </a:r>
+                      <a:endParaRPr lang="en-US" sz="2400" dirty="0"/>
+                    </a:p>
+                  </a:txBody>
+                  <a:tcPr/>
+                </a:tc>
+                <a:tc>
+                  <a:txBody>
+                    <a:bodyPr/>
+                    <a:lstStyle/>
+                    <a:p>
+                      <a:pPr algn="ctr"/>
+                      <a:r>
+                        <a:rPr lang="en-US" sz="2400" dirty="0" smtClean="0"/>
+                        <a:t>283</a:t>
+                      </a:r>
+                      <a:endParaRPr lang="en-US" sz="2400" dirty="0"/>
+                    </a:p>
+                  </a:txBody>
+                  <a:tcPr/>
+                </a:tc>
+              </a:tr>
+            </a:tbl>
+          </a:graphicData>
+        </a:graphic>
+      </p:graphicFrame>
+      <p:sp>
+        <p:nvSpPr>
+          <p:cNvPr id="24" name="TextBox 23"/>
+          <p:cNvSpPr txBox="1"/>
+          <p:nvPr/>
+        </p:nvSpPr>
+        <p:spPr>
+          <a:xfrm>
+            <a:off x="17857288" y="11733167"/>
+            <a:ext cx="3801838" cy="2677656"/>
+          </a:xfrm>
+          <a:prstGeom prst="rect">
+            <a:avLst/>
+          </a:prstGeom>
+          <a:noFill/>
+        </p:spPr>
+        <p:txBody>
+          <a:bodyPr wrap="square" rtlCol="0">
+            <a:spAutoFit/>
+          </a:bodyPr>
+          <a:lstStyle/>
+          <a:p>
+            <a:pPr algn="just"/>
+            <a:r>
+              <a:rPr lang="en-US" sz="2400" b="1" dirty="0" smtClean="0"/>
+              <a:t>Table 3 – </a:t>
+            </a:r>
+            <a:r>
+              <a:rPr lang="en-US" sz="2400" dirty="0" smtClean="0"/>
+              <a:t>Comparison of clustering implementations.  </a:t>
+            </a:r>
+            <a:r>
+              <a:rPr lang="en-US" sz="2400" dirty="0" err="1" smtClean="0"/>
+              <a:t>Hyperparameters</a:t>
+            </a:r>
+            <a:r>
+              <a:rPr lang="en-US" sz="2400" dirty="0" smtClean="0"/>
+              <a:t> that gave the same average distance between points as vanilla k-means were used to assess speed. </a:t>
             </a:r>
             <a:endParaRPr lang="en-US" sz="2400" b="1" dirty="0"/>
           </a:p>

</xml_diff>